<commit_message>
updating syllabus to reflect assignment dates
</commit_message>
<xml_diff>
--- a/05 - Monitoring.pptx
+++ b/05 - Monitoring.pptx
@@ -133,12 +133,12 @@
   <pc:docChgLst>
     <pc:chgData name="Michaeljon Miller" userId="c575fe5cddd8b8cf" providerId="LiveId" clId="{4070BA02-E50B-AF49-A092-E4E05D06716F}"/>
     <pc:docChg chg="custSel addSld modSld">
-      <pc:chgData name="Michaeljon Miller" userId="c575fe5cddd8b8cf" providerId="LiveId" clId="{4070BA02-E50B-AF49-A092-E4E05D06716F}" dt="2018-02-09T01:04:45.592" v="318" actId="20577"/>
+      <pc:chgData name="Michaeljon Miller" userId="c575fe5cddd8b8cf" providerId="LiveId" clId="{4070BA02-E50B-AF49-A092-E4E05D06716F}" dt="2018-02-09T01:36:32.255" v="401" actId="20577"/>
       <pc:docMkLst>
         <pc:docMk/>
       </pc:docMkLst>
       <pc:sldChg chg="modSp add">
-        <pc:chgData name="Michaeljon Miller" userId="c575fe5cddd8b8cf" providerId="LiveId" clId="{4070BA02-E50B-AF49-A092-E4E05D06716F}" dt="2018-02-09T01:04:45.592" v="318" actId="20577"/>
+        <pc:chgData name="Michaeljon Miller" userId="c575fe5cddd8b8cf" providerId="LiveId" clId="{4070BA02-E50B-AF49-A092-E4E05D06716F}" dt="2018-02-09T01:36:32.255" v="401" actId="20577"/>
         <pc:sldMkLst>
           <pc:docMk/>
           <pc:sldMk cId="2466095565" sldId="270"/>
@@ -152,7 +152,7 @@
           </ac:spMkLst>
         </pc:spChg>
         <pc:spChg chg="mod">
-          <ac:chgData name="Michaeljon Miller" userId="c575fe5cddd8b8cf" providerId="LiveId" clId="{4070BA02-E50B-AF49-A092-E4E05D06716F}" dt="2018-02-09T01:04:45.592" v="318" actId="20577"/>
+          <ac:chgData name="Michaeljon Miller" userId="c575fe5cddd8b8cf" providerId="LiveId" clId="{4070BA02-E50B-AF49-A092-E4E05D06716F}" dt="2018-02-09T01:36:32.255" v="401" actId="20577"/>
           <ac:spMkLst>
             <pc:docMk/>
             <pc:sldMk cId="2466095565" sldId="270"/>
@@ -5323,48 +5323,78 @@
           <a:bodyPr/>
           <a:lstStyle/>
           <a:p>
-            <a:r>
-              <a:rPr lang="en-US" dirty="0"/>
-              <a:t>I have posted the case studies assignment</a:t>
-            </a:r>
-          </a:p>
-          <a:p>
+            <a:pPr marL="0" indent="0">
+              <a:buNone/>
+            </a:pPr>
+            <a:r>
+              <a:rPr lang="en-US" dirty="0"/>
+              <a:t>I have posted the team case studies assignment</a:t>
+            </a:r>
+          </a:p>
+          <a:p>
+            <a:pPr marL="0" indent="0">
+              <a:buNone/>
+            </a:pPr>
             <a:r>
               <a:rPr lang="en-US" dirty="0"/>
               <a:t>Send me your teams by tomorrow evening</a:t>
             </a:r>
           </a:p>
           <a:p>
+            <a:pPr marL="0" indent="0">
+              <a:buNone/>
+            </a:pPr>
             <a:r>
               <a:rPr lang="en-US" dirty="0"/>
               <a:t>I have moved the presentations to 8 March</a:t>
             </a:r>
           </a:p>
           <a:p>
+            <a:pPr marL="0" indent="0">
+              <a:buNone/>
+            </a:pPr>
             <a:endParaRPr lang="en-US" dirty="0"/>
           </a:p>
           <a:p>
+            <a:pPr marL="0" indent="0">
+              <a:buNone/>
+            </a:pPr>
+            <a:r>
+              <a:rPr lang="en-US" dirty="0"/>
+              <a:t>I have posted the individual assignment – Due 22 Feb</a:t>
+            </a:r>
+          </a:p>
+          <a:p>
+            <a:pPr marL="0" indent="0">
+              <a:buNone/>
+            </a:pPr>
+            <a:endParaRPr lang="en-US" dirty="0"/>
+          </a:p>
+          <a:p>
+            <a:pPr marL="0" indent="0">
+              <a:buNone/>
+            </a:pPr>
             <a:r>
               <a:rPr lang="en-US" dirty="0"/>
               <a:t>I have changed the weighting</a:t>
             </a:r>
           </a:p>
           <a:p>
-            <a:pPr lvl="1"/>
+            <a:pPr marL="457200" lvl="1" indent="0">
+              <a:buNone/>
+            </a:pPr>
             <a:r>
               <a:rPr lang="en-US" dirty="0"/>
               <a:t>The team project is now 25% of your grade, and…</a:t>
             </a:r>
           </a:p>
           <a:p>
-            <a:pPr lvl="1"/>
-            <a:r>
-              <a:rPr lang="en-US" dirty="0"/>
-              <a:t>The individual project is now 15% of </a:t>
-            </a:r>
-            <a:r>
-              <a:rPr lang="en-US"/>
-              <a:t>your grade</a:t>
+            <a:pPr marL="457200" lvl="1" indent="0">
+              <a:buNone/>
+            </a:pPr>
+            <a:r>
+              <a:rPr lang="en-US" dirty="0"/>
+              <a:t>The individual project is now 15% of your grade</a:t>
             </a:r>
           </a:p>
         </p:txBody>

</xml_diff>